<commit_message>
amélioration Chapitre I vers2.0 et mise en place du mémoire Ver0.1
</commit_message>
<xml_diff>
--- a/CH.1 Introduction/Figures/rotor Newkirk.pptx
+++ b/CH.1 Introduction/Figures/rotor Newkirk.pptx
@@ -7,6 +7,7 @@
   <p:sldIdLst>
     <p:sldId id="257" r:id="rId2"/>
     <p:sldId id="258" r:id="rId3"/>
+    <p:sldId id="259" r:id="rId4"/>
   </p:sldIdLst>
   <p:sldSz cx="12192000" cy="6858000"/>
   <p:notesSz cx="6858000" cy="9144000"/>
@@ -105,6 +106,11 @@
       </a:defRPr>
     </a:lvl9pPr>
   </p:defaultTextStyle>
+  <p:extLst>
+    <p:ext uri="{EFAFB233-063F-42B5-8137-9DF3F51BA10A}">
+      <p15:sldGuideLst xmlns:p15="http://schemas.microsoft.com/office/powerpoint/2012/main"/>
+    </p:ext>
+  </p:extLst>
 </p:presentation>
 </file>
 
@@ -239,7 +245,7 @@
           <a:p>
             <a:fld id="{FE7F43E2-78BF-4059-9BD0-5FA962E03240}" type="datetimeFigureOut">
               <a:rPr lang="fr-FR" smtClean="0"/>
-              <a:t>18/12/2018</a:t>
+              <a:t>20/12/2018</a:t>
             </a:fld>
             <a:endParaRPr lang="fr-FR"/>
           </a:p>
@@ -409,7 +415,7 @@
           <a:p>
             <a:fld id="{FE7F43E2-78BF-4059-9BD0-5FA962E03240}" type="datetimeFigureOut">
               <a:rPr lang="fr-FR" smtClean="0"/>
-              <a:t>18/12/2018</a:t>
+              <a:t>20/12/2018</a:t>
             </a:fld>
             <a:endParaRPr lang="fr-FR"/>
           </a:p>
@@ -589,7 +595,7 @@
           <a:p>
             <a:fld id="{FE7F43E2-78BF-4059-9BD0-5FA962E03240}" type="datetimeFigureOut">
               <a:rPr lang="fr-FR" smtClean="0"/>
-              <a:t>18/12/2018</a:t>
+              <a:t>20/12/2018</a:t>
             </a:fld>
             <a:endParaRPr lang="fr-FR"/>
           </a:p>
@@ -759,7 +765,7 @@
           <a:p>
             <a:fld id="{FE7F43E2-78BF-4059-9BD0-5FA962E03240}" type="datetimeFigureOut">
               <a:rPr lang="fr-FR" smtClean="0"/>
-              <a:t>18/12/2018</a:t>
+              <a:t>20/12/2018</a:t>
             </a:fld>
             <a:endParaRPr lang="fr-FR"/>
           </a:p>
@@ -1005,7 +1011,7 @@
           <a:p>
             <a:fld id="{FE7F43E2-78BF-4059-9BD0-5FA962E03240}" type="datetimeFigureOut">
               <a:rPr lang="fr-FR" smtClean="0"/>
-              <a:t>18/12/2018</a:t>
+              <a:t>20/12/2018</a:t>
             </a:fld>
             <a:endParaRPr lang="fr-FR"/>
           </a:p>
@@ -1237,7 +1243,7 @@
           <a:p>
             <a:fld id="{FE7F43E2-78BF-4059-9BD0-5FA962E03240}" type="datetimeFigureOut">
               <a:rPr lang="fr-FR" smtClean="0"/>
-              <a:t>18/12/2018</a:t>
+              <a:t>20/12/2018</a:t>
             </a:fld>
             <a:endParaRPr lang="fr-FR"/>
           </a:p>
@@ -1604,7 +1610,7 @@
           <a:p>
             <a:fld id="{FE7F43E2-78BF-4059-9BD0-5FA962E03240}" type="datetimeFigureOut">
               <a:rPr lang="fr-FR" smtClean="0"/>
-              <a:t>18/12/2018</a:t>
+              <a:t>20/12/2018</a:t>
             </a:fld>
             <a:endParaRPr lang="fr-FR"/>
           </a:p>
@@ -1722,7 +1728,7 @@
           <a:p>
             <a:fld id="{FE7F43E2-78BF-4059-9BD0-5FA962E03240}" type="datetimeFigureOut">
               <a:rPr lang="fr-FR" smtClean="0"/>
-              <a:t>18/12/2018</a:t>
+              <a:t>20/12/2018</a:t>
             </a:fld>
             <a:endParaRPr lang="fr-FR"/>
           </a:p>
@@ -1817,7 +1823,7 @@
           <a:p>
             <a:fld id="{FE7F43E2-78BF-4059-9BD0-5FA962E03240}" type="datetimeFigureOut">
               <a:rPr lang="fr-FR" smtClean="0"/>
-              <a:t>18/12/2018</a:t>
+              <a:t>20/12/2018</a:t>
             </a:fld>
             <a:endParaRPr lang="fr-FR"/>
           </a:p>
@@ -2094,7 +2100,7 @@
           <a:p>
             <a:fld id="{FE7F43E2-78BF-4059-9BD0-5FA962E03240}" type="datetimeFigureOut">
               <a:rPr lang="fr-FR" smtClean="0"/>
-              <a:t>18/12/2018</a:t>
+              <a:t>20/12/2018</a:t>
             </a:fld>
             <a:endParaRPr lang="fr-FR"/>
           </a:p>
@@ -2347,7 +2353,7 @@
           <a:p>
             <a:fld id="{FE7F43E2-78BF-4059-9BD0-5FA962E03240}" type="datetimeFigureOut">
               <a:rPr lang="fr-FR" smtClean="0"/>
-              <a:t>18/12/2018</a:t>
+              <a:t>20/12/2018</a:t>
             </a:fld>
             <a:endParaRPr lang="fr-FR"/>
           </a:p>
@@ -2560,7 +2566,7 @@
           <a:p>
             <a:fld id="{FE7F43E2-78BF-4059-9BD0-5FA962E03240}" type="datetimeFigureOut">
               <a:rPr lang="fr-FR" smtClean="0"/>
-              <a:t>18/12/2018</a:t>
+              <a:t>20/12/2018</a:t>
             </a:fld>
             <a:endParaRPr lang="fr-FR"/>
           </a:p>
@@ -4699,6 +4705,431 @@
 </p:sld>
 </file>
 
+<file path=ppt/slides/slide3.xml><?xml version="1.0" encoding="utf-8"?>
+<p:sld xmlns:a="http://schemas.openxmlformats.org/drawingml/2006/main" xmlns:r="http://schemas.openxmlformats.org/officeDocument/2006/relationships" xmlns:p="http://schemas.openxmlformats.org/presentationml/2006/main">
+  <p:cSld>
+    <p:spTree>
+      <p:nvGrpSpPr>
+        <p:cNvPr id="1" name=""/>
+        <p:cNvGrpSpPr/>
+        <p:nvPr/>
+      </p:nvGrpSpPr>
+      <p:grpSpPr>
+        <a:xfrm>
+          <a:off x="0" y="0"/>
+          <a:ext cx="0" cy="0"/>
+          <a:chOff x="0" y="0"/>
+          <a:chExt cx="0" cy="0"/>
+        </a:xfrm>
+      </p:grpSpPr>
+      <p:pic>
+        <p:nvPicPr>
+          <p:cNvPr id="6" name="Espace réservé du contenu 5"/>
+          <p:cNvPicPr>
+            <a:picLocks noGrp="1" noChangeAspect="1"/>
+          </p:cNvPicPr>
+          <p:nvPr>
+            <p:ph idx="1"/>
+          </p:nvPr>
+        </p:nvPicPr>
+        <p:blipFill>
+          <a:blip r:embed="rId2">
+            <a:extLst>
+              <a:ext uri="{28A0092B-C50C-407E-A947-70E740481C1C}">
+                <a14:useLocalDpi xmlns:a14="http://schemas.microsoft.com/office/drawing/2010/main" val="0"/>
+              </a:ext>
+            </a:extLst>
+          </a:blip>
+          <a:stretch>
+            <a:fillRect/>
+          </a:stretch>
+        </p:blipFill>
+        <p:spPr>
+          <a:xfrm>
+            <a:off x="2266946" y="1825625"/>
+            <a:ext cx="7658107" cy="4351338"/>
+          </a:xfrm>
+        </p:spPr>
+      </p:pic>
+      <p:grpSp>
+        <p:nvGrpSpPr>
+          <p:cNvPr id="41" name="Groupe 40"/>
+          <p:cNvGrpSpPr/>
+          <p:nvPr/>
+        </p:nvGrpSpPr>
+        <p:grpSpPr>
+          <a:xfrm>
+            <a:off x="2835667" y="1489750"/>
+            <a:ext cx="7171362" cy="3135589"/>
+            <a:chOff x="2835667" y="1489750"/>
+            <a:chExt cx="7171362" cy="3135589"/>
+          </a:xfrm>
+        </p:grpSpPr>
+        <p:sp>
+          <p:nvSpPr>
+            <p:cNvPr id="8" name="Ellipse 7"/>
+            <p:cNvSpPr/>
+            <p:nvPr/>
+          </p:nvSpPr>
+          <p:spPr>
+            <a:xfrm>
+              <a:off x="7148074" y="2743200"/>
+              <a:ext cx="220979" cy="220979"/>
+            </a:xfrm>
+            <a:prstGeom prst="ellipse">
+              <a:avLst/>
+            </a:prstGeom>
+            <a:solidFill>
+              <a:srgbClr val="FF0000"/>
+            </a:solidFill>
+            <a:ln>
+              <a:solidFill>
+                <a:srgbClr val="FF0000"/>
+              </a:solidFill>
+            </a:ln>
+          </p:spPr>
+          <p:style>
+            <a:lnRef idx="2">
+              <a:schemeClr val="accent1">
+                <a:shade val="50000"/>
+              </a:schemeClr>
+            </a:lnRef>
+            <a:fillRef idx="1">
+              <a:schemeClr val="accent1"/>
+            </a:fillRef>
+            <a:effectRef idx="0">
+              <a:schemeClr val="accent1"/>
+            </a:effectRef>
+            <a:fontRef idx="minor">
+              <a:schemeClr val="lt1"/>
+            </a:fontRef>
+          </p:style>
+          <p:txBody>
+            <a:bodyPr rtlCol="0" anchor="ctr"/>
+            <a:lstStyle/>
+            <a:p>
+              <a:pPr algn="ctr"/>
+              <a:endParaRPr lang="fr-FR"/>
+            </a:p>
+          </p:txBody>
+        </p:sp>
+        <p:sp>
+          <p:nvSpPr>
+            <p:cNvPr id="9" name="Ellipse 8"/>
+            <p:cNvSpPr/>
+            <p:nvPr/>
+          </p:nvSpPr>
+          <p:spPr>
+            <a:xfrm>
+              <a:off x="5174494" y="4404360"/>
+              <a:ext cx="220979" cy="220979"/>
+            </a:xfrm>
+            <a:prstGeom prst="ellipse">
+              <a:avLst/>
+            </a:prstGeom>
+            <a:solidFill>
+              <a:srgbClr val="FF0000"/>
+            </a:solidFill>
+            <a:ln>
+              <a:solidFill>
+                <a:srgbClr val="FF0000"/>
+              </a:solidFill>
+            </a:ln>
+          </p:spPr>
+          <p:style>
+            <a:lnRef idx="2">
+              <a:schemeClr val="accent1">
+                <a:shade val="50000"/>
+              </a:schemeClr>
+            </a:lnRef>
+            <a:fillRef idx="1">
+              <a:schemeClr val="accent1"/>
+            </a:fillRef>
+            <a:effectRef idx="0">
+              <a:schemeClr val="accent1"/>
+            </a:effectRef>
+            <a:fontRef idx="minor">
+              <a:schemeClr val="lt1"/>
+            </a:fontRef>
+          </p:style>
+          <p:txBody>
+            <a:bodyPr rtlCol="0" anchor="ctr"/>
+            <a:lstStyle/>
+            <a:p>
+              <a:pPr algn="ctr"/>
+              <a:endParaRPr lang="fr-FR"/>
+            </a:p>
+          </p:txBody>
+        </p:sp>
+        <p:sp>
+          <p:nvSpPr>
+            <p:cNvPr id="10" name="Ellipse 9"/>
+            <p:cNvSpPr/>
+            <p:nvPr/>
+          </p:nvSpPr>
+          <p:spPr>
+            <a:xfrm>
+              <a:off x="6805174" y="3963193"/>
+              <a:ext cx="220979" cy="220979"/>
+            </a:xfrm>
+            <a:prstGeom prst="ellipse">
+              <a:avLst/>
+            </a:prstGeom>
+            <a:solidFill>
+              <a:srgbClr val="FF0000"/>
+            </a:solidFill>
+            <a:ln>
+              <a:solidFill>
+                <a:srgbClr val="FF0000"/>
+              </a:solidFill>
+            </a:ln>
+          </p:spPr>
+          <p:style>
+            <a:lnRef idx="2">
+              <a:schemeClr val="accent1">
+                <a:shade val="50000"/>
+              </a:schemeClr>
+            </a:lnRef>
+            <a:fillRef idx="1">
+              <a:schemeClr val="accent1"/>
+            </a:fillRef>
+            <a:effectRef idx="0">
+              <a:schemeClr val="accent1"/>
+            </a:effectRef>
+            <a:fontRef idx="minor">
+              <a:schemeClr val="lt1"/>
+            </a:fontRef>
+          </p:style>
+          <p:txBody>
+            <a:bodyPr rtlCol="0" anchor="ctr"/>
+            <a:lstStyle/>
+            <a:p>
+              <a:pPr algn="ctr"/>
+              <a:endParaRPr lang="fr-FR"/>
+            </a:p>
+          </p:txBody>
+        </p:sp>
+        <p:cxnSp>
+          <p:nvCxnSpPr>
+            <p:cNvPr id="14" name="Connecteur droit avec flèche 13"/>
+            <p:cNvCxnSpPr>
+              <a:stCxn id="16" idx="2"/>
+              <a:endCxn id="8" idx="7"/>
+            </p:cNvCxnSpPr>
+            <p:nvPr/>
+          </p:nvCxnSpPr>
+          <p:spPr>
+            <a:xfrm flipH="1">
+              <a:off x="7336691" y="2320747"/>
+              <a:ext cx="1427165" cy="454815"/>
+            </a:xfrm>
+            <a:prstGeom prst="straightConnector1">
+              <a:avLst/>
+            </a:prstGeom>
+            <a:ln w="12700">
+              <a:tailEnd type="triangle"/>
+            </a:ln>
+          </p:spPr>
+          <p:style>
+            <a:lnRef idx="1">
+              <a:schemeClr val="dk1"/>
+            </a:lnRef>
+            <a:fillRef idx="0">
+              <a:schemeClr val="dk1"/>
+            </a:fillRef>
+            <a:effectRef idx="0">
+              <a:schemeClr val="dk1"/>
+            </a:effectRef>
+            <a:fontRef idx="minor">
+              <a:schemeClr val="tx1"/>
+            </a:fontRef>
+          </p:style>
+        </p:cxnSp>
+        <p:sp>
+          <p:nvSpPr>
+            <p:cNvPr id="16" name="ZoneTexte 15"/>
+            <p:cNvSpPr txBox="1"/>
+            <p:nvPr/>
+          </p:nvSpPr>
+          <p:spPr>
+            <a:xfrm>
+              <a:off x="7520683" y="1489750"/>
+              <a:ext cx="2486346" cy="830997"/>
+            </a:xfrm>
+            <a:prstGeom prst="rect">
+              <a:avLst/>
+            </a:prstGeom>
+            <a:noFill/>
+          </p:spPr>
+          <p:txBody>
+            <a:bodyPr wrap="square" rtlCol="0">
+              <a:spAutoFit/>
+            </a:bodyPr>
+            <a:lstStyle/>
+            <a:p>
+              <a:pPr algn="ctr"/>
+              <a:r>
+                <a:rPr lang="fr-FR" sz="2400" dirty="0"/>
+                <a:t>Z</a:t>
+              </a:r>
+              <a:r>
+                <a:rPr lang="fr-FR" sz="2400" dirty="0" smtClean="0"/>
+                <a:t>one du contact (Point chaud)</a:t>
+              </a:r>
+              <a:endParaRPr lang="fr-FR" sz="2400" dirty="0"/>
+            </a:p>
+          </p:txBody>
+        </p:sp>
+        <p:sp>
+          <p:nvSpPr>
+            <p:cNvPr id="19" name="ZoneTexte 18"/>
+            <p:cNvSpPr txBox="1"/>
+            <p:nvPr/>
+          </p:nvSpPr>
+          <p:spPr>
+            <a:xfrm>
+              <a:off x="2835667" y="3631962"/>
+              <a:ext cx="943853" cy="461665"/>
+            </a:xfrm>
+            <a:prstGeom prst="rect">
+              <a:avLst/>
+            </a:prstGeom>
+            <a:noFill/>
+          </p:spPr>
+          <p:txBody>
+            <a:bodyPr wrap="square" rtlCol="0">
+              <a:spAutoFit/>
+            </a:bodyPr>
+            <a:lstStyle/>
+            <a:p>
+              <a:r>
+                <a:rPr lang="fr-FR" sz="2400" dirty="0" smtClean="0"/>
+                <a:t>Rotor</a:t>
+              </a:r>
+              <a:r>
+                <a:rPr lang="fr-FR" dirty="0" smtClean="0"/>
+                <a:t> </a:t>
+              </a:r>
+              <a:endParaRPr lang="fr-FR" dirty="0"/>
+            </a:p>
+          </p:txBody>
+        </p:sp>
+        <p:cxnSp>
+          <p:nvCxnSpPr>
+            <p:cNvPr id="20" name="Connecteur droit avec flèche 19"/>
+            <p:cNvCxnSpPr/>
+            <p:nvPr/>
+          </p:nvCxnSpPr>
+          <p:spPr>
+            <a:xfrm>
+              <a:off x="3779520" y="3816628"/>
+              <a:ext cx="1394974" cy="257054"/>
+            </a:xfrm>
+            <a:prstGeom prst="straightConnector1">
+              <a:avLst/>
+            </a:prstGeom>
+            <a:ln w="12700">
+              <a:tailEnd type="triangle"/>
+            </a:ln>
+          </p:spPr>
+          <p:style>
+            <a:lnRef idx="1">
+              <a:schemeClr val="dk1"/>
+            </a:lnRef>
+            <a:fillRef idx="0">
+              <a:schemeClr val="dk1"/>
+            </a:fillRef>
+            <a:effectRef idx="0">
+              <a:schemeClr val="dk1"/>
+            </a:effectRef>
+            <a:fontRef idx="minor">
+              <a:schemeClr val="tx1"/>
+            </a:fontRef>
+          </p:style>
+        </p:cxnSp>
+        <p:sp>
+          <p:nvSpPr>
+            <p:cNvPr id="35" name="ZoneTexte 34"/>
+            <p:cNvSpPr txBox="1"/>
+            <p:nvPr/>
+          </p:nvSpPr>
+          <p:spPr>
+            <a:xfrm>
+              <a:off x="8642839" y="4137511"/>
+              <a:ext cx="943853" cy="461665"/>
+            </a:xfrm>
+            <a:prstGeom prst="rect">
+              <a:avLst/>
+            </a:prstGeom>
+            <a:noFill/>
+          </p:spPr>
+          <p:txBody>
+            <a:bodyPr wrap="square" rtlCol="0">
+              <a:spAutoFit/>
+            </a:bodyPr>
+            <a:lstStyle/>
+            <a:p>
+              <a:r>
+                <a:rPr lang="fr-FR" sz="2400" dirty="0" smtClean="0"/>
+                <a:t>Stator</a:t>
+              </a:r>
+              <a:r>
+                <a:rPr lang="fr-FR" dirty="0" smtClean="0"/>
+                <a:t> </a:t>
+              </a:r>
+              <a:endParaRPr lang="fr-FR" dirty="0"/>
+            </a:p>
+          </p:txBody>
+        </p:sp>
+        <p:cxnSp>
+          <p:nvCxnSpPr>
+            <p:cNvPr id="36" name="Connecteur droit avec flèche 35"/>
+            <p:cNvCxnSpPr>
+              <a:stCxn id="35" idx="1"/>
+            </p:cNvCxnSpPr>
+            <p:nvPr/>
+          </p:nvCxnSpPr>
+          <p:spPr>
+            <a:xfrm flipH="1" flipV="1">
+              <a:off x="7952199" y="3963194"/>
+              <a:ext cx="690640" cy="405150"/>
+            </a:xfrm>
+            <a:prstGeom prst="straightConnector1">
+              <a:avLst/>
+            </a:prstGeom>
+            <a:ln w="12700">
+              <a:tailEnd type="triangle"/>
+            </a:ln>
+          </p:spPr>
+          <p:style>
+            <a:lnRef idx="1">
+              <a:schemeClr val="dk1"/>
+            </a:lnRef>
+            <a:fillRef idx="0">
+              <a:schemeClr val="dk1"/>
+            </a:fillRef>
+            <a:effectRef idx="0">
+              <a:schemeClr val="dk1"/>
+            </a:effectRef>
+            <a:fontRef idx="minor">
+              <a:schemeClr val="tx1"/>
+            </a:fontRef>
+          </p:style>
+        </p:cxnSp>
+      </p:grpSp>
+    </p:spTree>
+    <p:extLst>
+      <p:ext uri="{BB962C8B-B14F-4D97-AF65-F5344CB8AC3E}">
+        <p14:creationId xmlns:p14="http://schemas.microsoft.com/office/powerpoint/2010/main" val="1366126142"/>
+      </p:ext>
+    </p:extLst>
+  </p:cSld>
+  <p:clrMapOvr>
+    <a:masterClrMapping/>
+  </p:clrMapOvr>
+</p:sld>
+</file>
+
 <file path=ppt/theme/theme1.xml><?xml version="1.0" encoding="utf-8"?>
 <a:theme xmlns:a="http://schemas.openxmlformats.org/drawingml/2006/main" name="Thème Office">
   <a:themeElements>

</xml_diff>